<commit_message>
changed the logic completely
</commit_message>
<xml_diff>
--- a/Test interface.pptx
+++ b/Test interface.pptx
@@ -7,10 +7,9 @@
   <p:sldIdLst>
     <p:sldId id="256" r:id="rId5"/>
     <p:sldId id="257" r:id="rId6"/>
-    <p:sldId id="259" r:id="rId7"/>
-    <p:sldId id="260" r:id="rId8"/>
-    <p:sldId id="261" r:id="rId9"/>
-    <p:sldId id="258" r:id="rId10"/>
+    <p:sldId id="260" r:id="rId7"/>
+    <p:sldId id="261" r:id="rId8"/>
+    <p:sldId id="258" r:id="rId9"/>
   </p:sldIdLst>
   <p:sldSz cx="12192000" cy="6858000"/>
   <p:notesSz cx="6858000" cy="9144000"/>
@@ -143,6 +142,166 @@
 
 <file path=ppt/changesInfos/changesInfo1.xml><?xml version="1.0" encoding="utf-8"?>
 <pc:chgInfo xmlns:a="http://schemas.openxmlformats.org/drawingml/2006/main" xmlns:r="http://schemas.openxmlformats.org/officeDocument/2006/relationships" xmlns:ac="http://schemas.microsoft.com/office/drawing/2013/main/command" xmlns:pc="http://schemas.microsoft.com/office/powerpoint/2013/main/command">
+  <pc:docChgLst>
+    <pc:chgData name="Harry Delalis" userId="e707da9d-0989-49e5-9cfe-80f5fc5a8e78" providerId="ADAL" clId="{019419A2-9973-4246-B770-D378C33618EE}"/>
+    <pc:docChg chg="custSel addSld modSld">
+      <pc:chgData name="Harry Delalis" userId="e707da9d-0989-49e5-9cfe-80f5fc5a8e78" providerId="ADAL" clId="{019419A2-9973-4246-B770-D378C33618EE}" dt="2025-01-14T09:30:21.748" v="531" actId="20577"/>
+      <pc:docMkLst>
+        <pc:docMk/>
+      </pc:docMkLst>
+      <pc:sldChg chg="addSp delSp modSp new mod">
+        <pc:chgData name="Harry Delalis" userId="e707da9d-0989-49e5-9cfe-80f5fc5a8e78" providerId="ADAL" clId="{019419A2-9973-4246-B770-D378C33618EE}" dt="2025-01-14T09:30:21.748" v="531" actId="20577"/>
+        <pc:sldMkLst>
+          <pc:docMk/>
+          <pc:sldMk cId="2259676099" sldId="259"/>
+        </pc:sldMkLst>
+        <pc:spChg chg="mod">
+          <ac:chgData name="Harry Delalis" userId="e707da9d-0989-49e5-9cfe-80f5fc5a8e78" providerId="ADAL" clId="{019419A2-9973-4246-B770-D378C33618EE}" dt="2025-01-14T09:05:34.507" v="9" actId="20577"/>
+          <ac:spMkLst>
+            <pc:docMk/>
+            <pc:sldMk cId="2259676099" sldId="259"/>
+            <ac:spMk id="2" creationId="{C97A6B4F-F10F-8A5F-C1C9-7AA3C0532862}"/>
+          </ac:spMkLst>
+        </pc:spChg>
+        <pc:spChg chg="del">
+          <ac:chgData name="Harry Delalis" userId="e707da9d-0989-49e5-9cfe-80f5fc5a8e78" providerId="ADAL" clId="{019419A2-9973-4246-B770-D378C33618EE}" dt="2025-01-14T09:05:41.997" v="10" actId="478"/>
+          <ac:spMkLst>
+            <pc:docMk/>
+            <pc:sldMk cId="2259676099" sldId="259"/>
+            <ac:spMk id="3" creationId="{17816DC9-88C2-8859-289D-4054989589B7}"/>
+          </ac:spMkLst>
+        </pc:spChg>
+        <pc:spChg chg="add del mod">
+          <ac:chgData name="Harry Delalis" userId="e707da9d-0989-49e5-9cfe-80f5fc5a8e78" providerId="ADAL" clId="{019419A2-9973-4246-B770-D378C33618EE}" dt="2025-01-14T09:06:09.514" v="40" actId="478"/>
+          <ac:spMkLst>
+            <pc:docMk/>
+            <pc:sldMk cId="2259676099" sldId="259"/>
+            <ac:spMk id="7" creationId="{7F596457-D459-D881-1947-B2ADFA740E38}"/>
+          </ac:spMkLst>
+        </pc:spChg>
+        <pc:graphicFrameChg chg="add mod modGraphic">
+          <ac:chgData name="Harry Delalis" userId="e707da9d-0989-49e5-9cfe-80f5fc5a8e78" providerId="ADAL" clId="{019419A2-9973-4246-B770-D378C33618EE}" dt="2025-01-14T09:30:21.748" v="531" actId="20577"/>
+          <ac:graphicFrameMkLst>
+            <pc:docMk/>
+            <pc:sldMk cId="2259676099" sldId="259"/>
+            <ac:graphicFrameMk id="8" creationId="{A916A793-3D69-DED2-E9A7-B68267DB3EC1}"/>
+          </ac:graphicFrameMkLst>
+        </pc:graphicFrameChg>
+        <pc:graphicFrameChg chg="add mod modGraphic">
+          <ac:chgData name="Harry Delalis" userId="e707da9d-0989-49e5-9cfe-80f5fc5a8e78" providerId="ADAL" clId="{019419A2-9973-4246-B770-D378C33618EE}" dt="2025-01-14T09:18:05.453" v="449" actId="14100"/>
+          <ac:graphicFrameMkLst>
+            <pc:docMk/>
+            <pc:sldMk cId="2259676099" sldId="259"/>
+            <ac:graphicFrameMk id="9" creationId="{5D3B5A4E-A7FE-89F0-6AB7-076354A3C6E0}"/>
+          </ac:graphicFrameMkLst>
+        </pc:graphicFrameChg>
+        <pc:graphicFrameChg chg="add mod modGraphic">
+          <ac:chgData name="Harry Delalis" userId="e707da9d-0989-49e5-9cfe-80f5fc5a8e78" providerId="ADAL" clId="{019419A2-9973-4246-B770-D378C33618EE}" dt="2025-01-14T09:19:23.422" v="522" actId="20577"/>
+          <ac:graphicFrameMkLst>
+            <pc:docMk/>
+            <pc:sldMk cId="2259676099" sldId="259"/>
+            <ac:graphicFrameMk id="10" creationId="{04B6638D-F677-DF4C-C504-F2B9FEE28CB2}"/>
+          </ac:graphicFrameMkLst>
+        </pc:graphicFrameChg>
+      </pc:sldChg>
+    </pc:docChg>
+  </pc:docChgLst>
+  <pc:docChgLst>
+    <pc:chgData name="Harry Delalis" userId="e707da9d-0989-49e5-9cfe-80f5fc5a8e78" providerId="ADAL" clId="{DEC9FBB0-E756-4C13-BAC4-6F56C4073016}"/>
+    <pc:docChg chg="undo custSel modSld">
+      <pc:chgData name="Harry Delalis" userId="e707da9d-0989-49e5-9cfe-80f5fc5a8e78" providerId="ADAL" clId="{DEC9FBB0-E756-4C13-BAC4-6F56C4073016}" dt="2024-12-18T15:30:57.826" v="61" actId="1076"/>
+      <pc:docMkLst>
+        <pc:docMk/>
+      </pc:docMkLst>
+      <pc:sldChg chg="addSp delSp modSp mod">
+        <pc:chgData name="Harry Delalis" userId="e707da9d-0989-49e5-9cfe-80f5fc5a8e78" providerId="ADAL" clId="{DEC9FBB0-E756-4C13-BAC4-6F56C4073016}" dt="2024-12-18T15:30:57.826" v="61" actId="1076"/>
+        <pc:sldMkLst>
+          <pc:docMk/>
+          <pc:sldMk cId="3258568218" sldId="257"/>
+        </pc:sldMkLst>
+        <pc:spChg chg="add mod">
+          <ac:chgData name="Harry Delalis" userId="e707da9d-0989-49e5-9cfe-80f5fc5a8e78" providerId="ADAL" clId="{DEC9FBB0-E756-4C13-BAC4-6F56C4073016}" dt="2024-12-18T15:28:38.910" v="45" actId="1076"/>
+          <ac:spMkLst>
+            <pc:docMk/>
+            <pc:sldMk cId="3258568218" sldId="257"/>
+            <ac:spMk id="3" creationId="{A6479357-C494-D2A2-2DBD-C95DD170D6E6}"/>
+          </ac:spMkLst>
+        </pc:spChg>
+        <pc:spChg chg="add mod">
+          <ac:chgData name="Harry Delalis" userId="e707da9d-0989-49e5-9cfe-80f5fc5a8e78" providerId="ADAL" clId="{DEC9FBB0-E756-4C13-BAC4-6F56C4073016}" dt="2024-12-18T15:30:57.826" v="61" actId="1076"/>
+          <ac:spMkLst>
+            <pc:docMk/>
+            <pc:sldMk cId="3258568218" sldId="257"/>
+            <ac:spMk id="4" creationId="{274F68D4-41A6-0D77-BE5C-40C6F46B8224}"/>
+          </ac:spMkLst>
+        </pc:spChg>
+        <pc:spChg chg="del">
+          <ac:chgData name="Harry Delalis" userId="e707da9d-0989-49e5-9cfe-80f5fc5a8e78" providerId="ADAL" clId="{DEC9FBB0-E756-4C13-BAC4-6F56C4073016}" dt="2024-12-18T15:28:16.359" v="40" actId="478"/>
+          <ac:spMkLst>
+            <pc:docMk/>
+            <pc:sldMk cId="3258568218" sldId="257"/>
+            <ac:spMk id="5" creationId="{00000000-0000-0000-0000-000000000000}"/>
+          </ac:spMkLst>
+        </pc:spChg>
+        <pc:spChg chg="del">
+          <ac:chgData name="Harry Delalis" userId="e707da9d-0989-49e5-9cfe-80f5fc5a8e78" providerId="ADAL" clId="{DEC9FBB0-E756-4C13-BAC4-6F56C4073016}" dt="2024-12-18T15:28:18.267" v="41" actId="478"/>
+          <ac:spMkLst>
+            <pc:docMk/>
+            <pc:sldMk cId="3258568218" sldId="257"/>
+            <ac:spMk id="6" creationId="{00000000-0000-0000-0000-000000000000}"/>
+          </ac:spMkLst>
+        </pc:spChg>
+        <pc:spChg chg="mod">
+          <ac:chgData name="Harry Delalis" userId="e707da9d-0989-49e5-9cfe-80f5fc5a8e78" providerId="ADAL" clId="{DEC9FBB0-E756-4C13-BAC4-6F56C4073016}" dt="2024-12-18T15:24:58.399" v="15" actId="20577"/>
+          <ac:spMkLst>
+            <pc:docMk/>
+            <pc:sldMk cId="3258568218" sldId="257"/>
+            <ac:spMk id="104" creationId="{22118FD3-9C1E-0534-76D8-48C702697259}"/>
+          </ac:spMkLst>
+        </pc:spChg>
+        <pc:spChg chg="mod">
+          <ac:chgData name="Harry Delalis" userId="e707da9d-0989-49e5-9cfe-80f5fc5a8e78" providerId="ADAL" clId="{DEC9FBB0-E756-4C13-BAC4-6F56C4073016}" dt="2024-12-18T15:25:07.327" v="27" actId="20577"/>
+          <ac:spMkLst>
+            <pc:docMk/>
+            <pc:sldMk cId="3258568218" sldId="257"/>
+            <ac:spMk id="123" creationId="{AB8783FA-2A00-E45A-52BA-50379BEE6E60}"/>
+          </ac:spMkLst>
+        </pc:spChg>
+        <pc:spChg chg="mod">
+          <ac:chgData name="Harry Delalis" userId="e707da9d-0989-49e5-9cfe-80f5fc5a8e78" providerId="ADAL" clId="{DEC9FBB0-E756-4C13-BAC4-6F56C4073016}" dt="2024-12-18T15:25:10.999" v="33" actId="20577"/>
+          <ac:spMkLst>
+            <pc:docMk/>
+            <pc:sldMk cId="3258568218" sldId="257"/>
+            <ac:spMk id="128" creationId="{B1B5CC22-6E67-392F-77AC-23AD89B197C5}"/>
+          </ac:spMkLst>
+        </pc:spChg>
+        <pc:spChg chg="mod">
+          <ac:chgData name="Harry Delalis" userId="e707da9d-0989-49e5-9cfe-80f5fc5a8e78" providerId="ADAL" clId="{DEC9FBB0-E756-4C13-BAC4-6F56C4073016}" dt="2024-12-18T15:28:59.465" v="52" actId="1076"/>
+          <ac:spMkLst>
+            <pc:docMk/>
+            <pc:sldMk cId="3258568218" sldId="257"/>
+            <ac:spMk id="132" creationId="{81797886-F892-00F9-DF9A-6587110FF282}"/>
+          </ac:spMkLst>
+        </pc:spChg>
+        <pc:spChg chg="mod">
+          <ac:chgData name="Harry Delalis" userId="e707da9d-0989-49e5-9cfe-80f5fc5a8e78" providerId="ADAL" clId="{DEC9FBB0-E756-4C13-BAC4-6F56C4073016}" dt="2024-12-18T15:30:44.838" v="59" actId="1076"/>
+          <ac:spMkLst>
+            <pc:docMk/>
+            <pc:sldMk cId="3258568218" sldId="257"/>
+            <ac:spMk id="133" creationId="{BA300EA4-2C65-0C28-0CB8-E6CD78DAC4C6}"/>
+          </ac:spMkLst>
+        </pc:spChg>
+        <pc:cxnChg chg="mod">
+          <ac:chgData name="Harry Delalis" userId="e707da9d-0989-49e5-9cfe-80f5fc5a8e78" providerId="ADAL" clId="{DEC9FBB0-E756-4C13-BAC4-6F56C4073016}" dt="2024-12-18T15:27:42.499" v="34" actId="1076"/>
+          <ac:cxnSpMkLst>
+            <pc:docMk/>
+            <pc:sldMk cId="3258568218" sldId="257"/>
+            <ac:cxnSpMk id="114" creationId="{1AB5F643-3FFF-2BDF-1887-2509B1FE9DB4}"/>
+          </ac:cxnSpMkLst>
+        </pc:cxnChg>
+      </pc:sldChg>
+    </pc:docChg>
+  </pc:docChgLst>
   <pc:docChgLst>
     <pc:chgData name="Harry Delalis" userId="e707da9d-0989-49e5-9cfe-80f5fc5a8e78" providerId="ADAL" clId="{69364FDF-CC31-415D-83D9-466D76680156}"/>
     <pc:docChg chg="undo custSel addSld modSld">
@@ -507,166 +666,6 @@
             <ac:grpSpMk id="18" creationId="{A399DD58-632D-6447-370A-004C382E8413}"/>
           </ac:grpSpMkLst>
         </pc:grpChg>
-      </pc:sldChg>
-    </pc:docChg>
-  </pc:docChgLst>
-  <pc:docChgLst>
-    <pc:chgData name="Harry Delalis" userId="e707da9d-0989-49e5-9cfe-80f5fc5a8e78" providerId="ADAL" clId="{DEC9FBB0-E756-4C13-BAC4-6F56C4073016}"/>
-    <pc:docChg chg="undo custSel modSld">
-      <pc:chgData name="Harry Delalis" userId="e707da9d-0989-49e5-9cfe-80f5fc5a8e78" providerId="ADAL" clId="{DEC9FBB0-E756-4C13-BAC4-6F56C4073016}" dt="2024-12-18T15:30:57.826" v="61" actId="1076"/>
-      <pc:docMkLst>
-        <pc:docMk/>
-      </pc:docMkLst>
-      <pc:sldChg chg="addSp delSp modSp mod">
-        <pc:chgData name="Harry Delalis" userId="e707da9d-0989-49e5-9cfe-80f5fc5a8e78" providerId="ADAL" clId="{DEC9FBB0-E756-4C13-BAC4-6F56C4073016}" dt="2024-12-18T15:30:57.826" v="61" actId="1076"/>
-        <pc:sldMkLst>
-          <pc:docMk/>
-          <pc:sldMk cId="3258568218" sldId="257"/>
-        </pc:sldMkLst>
-        <pc:spChg chg="add mod">
-          <ac:chgData name="Harry Delalis" userId="e707da9d-0989-49e5-9cfe-80f5fc5a8e78" providerId="ADAL" clId="{DEC9FBB0-E756-4C13-BAC4-6F56C4073016}" dt="2024-12-18T15:28:38.910" v="45" actId="1076"/>
-          <ac:spMkLst>
-            <pc:docMk/>
-            <pc:sldMk cId="3258568218" sldId="257"/>
-            <ac:spMk id="3" creationId="{A6479357-C494-D2A2-2DBD-C95DD170D6E6}"/>
-          </ac:spMkLst>
-        </pc:spChg>
-        <pc:spChg chg="add mod">
-          <ac:chgData name="Harry Delalis" userId="e707da9d-0989-49e5-9cfe-80f5fc5a8e78" providerId="ADAL" clId="{DEC9FBB0-E756-4C13-BAC4-6F56C4073016}" dt="2024-12-18T15:30:57.826" v="61" actId="1076"/>
-          <ac:spMkLst>
-            <pc:docMk/>
-            <pc:sldMk cId="3258568218" sldId="257"/>
-            <ac:spMk id="4" creationId="{274F68D4-41A6-0D77-BE5C-40C6F46B8224}"/>
-          </ac:spMkLst>
-        </pc:spChg>
-        <pc:spChg chg="del">
-          <ac:chgData name="Harry Delalis" userId="e707da9d-0989-49e5-9cfe-80f5fc5a8e78" providerId="ADAL" clId="{DEC9FBB0-E756-4C13-BAC4-6F56C4073016}" dt="2024-12-18T15:28:16.359" v="40" actId="478"/>
-          <ac:spMkLst>
-            <pc:docMk/>
-            <pc:sldMk cId="3258568218" sldId="257"/>
-            <ac:spMk id="5" creationId="{00000000-0000-0000-0000-000000000000}"/>
-          </ac:spMkLst>
-        </pc:spChg>
-        <pc:spChg chg="del">
-          <ac:chgData name="Harry Delalis" userId="e707da9d-0989-49e5-9cfe-80f5fc5a8e78" providerId="ADAL" clId="{DEC9FBB0-E756-4C13-BAC4-6F56C4073016}" dt="2024-12-18T15:28:18.267" v="41" actId="478"/>
-          <ac:spMkLst>
-            <pc:docMk/>
-            <pc:sldMk cId="3258568218" sldId="257"/>
-            <ac:spMk id="6" creationId="{00000000-0000-0000-0000-000000000000}"/>
-          </ac:spMkLst>
-        </pc:spChg>
-        <pc:spChg chg="mod">
-          <ac:chgData name="Harry Delalis" userId="e707da9d-0989-49e5-9cfe-80f5fc5a8e78" providerId="ADAL" clId="{DEC9FBB0-E756-4C13-BAC4-6F56C4073016}" dt="2024-12-18T15:24:58.399" v="15" actId="20577"/>
-          <ac:spMkLst>
-            <pc:docMk/>
-            <pc:sldMk cId="3258568218" sldId="257"/>
-            <ac:spMk id="104" creationId="{22118FD3-9C1E-0534-76D8-48C702697259}"/>
-          </ac:spMkLst>
-        </pc:spChg>
-        <pc:spChg chg="mod">
-          <ac:chgData name="Harry Delalis" userId="e707da9d-0989-49e5-9cfe-80f5fc5a8e78" providerId="ADAL" clId="{DEC9FBB0-E756-4C13-BAC4-6F56C4073016}" dt="2024-12-18T15:25:07.327" v="27" actId="20577"/>
-          <ac:spMkLst>
-            <pc:docMk/>
-            <pc:sldMk cId="3258568218" sldId="257"/>
-            <ac:spMk id="123" creationId="{AB8783FA-2A00-E45A-52BA-50379BEE6E60}"/>
-          </ac:spMkLst>
-        </pc:spChg>
-        <pc:spChg chg="mod">
-          <ac:chgData name="Harry Delalis" userId="e707da9d-0989-49e5-9cfe-80f5fc5a8e78" providerId="ADAL" clId="{DEC9FBB0-E756-4C13-BAC4-6F56C4073016}" dt="2024-12-18T15:25:10.999" v="33" actId="20577"/>
-          <ac:spMkLst>
-            <pc:docMk/>
-            <pc:sldMk cId="3258568218" sldId="257"/>
-            <ac:spMk id="128" creationId="{B1B5CC22-6E67-392F-77AC-23AD89B197C5}"/>
-          </ac:spMkLst>
-        </pc:spChg>
-        <pc:spChg chg="mod">
-          <ac:chgData name="Harry Delalis" userId="e707da9d-0989-49e5-9cfe-80f5fc5a8e78" providerId="ADAL" clId="{DEC9FBB0-E756-4C13-BAC4-6F56C4073016}" dt="2024-12-18T15:28:59.465" v="52" actId="1076"/>
-          <ac:spMkLst>
-            <pc:docMk/>
-            <pc:sldMk cId="3258568218" sldId="257"/>
-            <ac:spMk id="132" creationId="{81797886-F892-00F9-DF9A-6587110FF282}"/>
-          </ac:spMkLst>
-        </pc:spChg>
-        <pc:spChg chg="mod">
-          <ac:chgData name="Harry Delalis" userId="e707da9d-0989-49e5-9cfe-80f5fc5a8e78" providerId="ADAL" clId="{DEC9FBB0-E756-4C13-BAC4-6F56C4073016}" dt="2024-12-18T15:30:44.838" v="59" actId="1076"/>
-          <ac:spMkLst>
-            <pc:docMk/>
-            <pc:sldMk cId="3258568218" sldId="257"/>
-            <ac:spMk id="133" creationId="{BA300EA4-2C65-0C28-0CB8-E6CD78DAC4C6}"/>
-          </ac:spMkLst>
-        </pc:spChg>
-        <pc:cxnChg chg="mod">
-          <ac:chgData name="Harry Delalis" userId="e707da9d-0989-49e5-9cfe-80f5fc5a8e78" providerId="ADAL" clId="{DEC9FBB0-E756-4C13-BAC4-6F56C4073016}" dt="2024-12-18T15:27:42.499" v="34" actId="1076"/>
-          <ac:cxnSpMkLst>
-            <pc:docMk/>
-            <pc:sldMk cId="3258568218" sldId="257"/>
-            <ac:cxnSpMk id="114" creationId="{1AB5F643-3FFF-2BDF-1887-2509B1FE9DB4}"/>
-          </ac:cxnSpMkLst>
-        </pc:cxnChg>
-      </pc:sldChg>
-    </pc:docChg>
-  </pc:docChgLst>
-  <pc:docChgLst>
-    <pc:chgData name="Harry Delalis" userId="e707da9d-0989-49e5-9cfe-80f5fc5a8e78" providerId="ADAL" clId="{019419A2-9973-4246-B770-D378C33618EE}"/>
-    <pc:docChg chg="custSel addSld modSld">
-      <pc:chgData name="Harry Delalis" userId="e707da9d-0989-49e5-9cfe-80f5fc5a8e78" providerId="ADAL" clId="{019419A2-9973-4246-B770-D378C33618EE}" dt="2025-01-14T09:30:21.748" v="531" actId="20577"/>
-      <pc:docMkLst>
-        <pc:docMk/>
-      </pc:docMkLst>
-      <pc:sldChg chg="addSp delSp modSp new mod">
-        <pc:chgData name="Harry Delalis" userId="e707da9d-0989-49e5-9cfe-80f5fc5a8e78" providerId="ADAL" clId="{019419A2-9973-4246-B770-D378C33618EE}" dt="2025-01-14T09:30:21.748" v="531" actId="20577"/>
-        <pc:sldMkLst>
-          <pc:docMk/>
-          <pc:sldMk cId="2259676099" sldId="259"/>
-        </pc:sldMkLst>
-        <pc:spChg chg="mod">
-          <ac:chgData name="Harry Delalis" userId="e707da9d-0989-49e5-9cfe-80f5fc5a8e78" providerId="ADAL" clId="{019419A2-9973-4246-B770-D378C33618EE}" dt="2025-01-14T09:05:34.507" v="9" actId="20577"/>
-          <ac:spMkLst>
-            <pc:docMk/>
-            <pc:sldMk cId="2259676099" sldId="259"/>
-            <ac:spMk id="2" creationId="{C97A6B4F-F10F-8A5F-C1C9-7AA3C0532862}"/>
-          </ac:spMkLst>
-        </pc:spChg>
-        <pc:spChg chg="del">
-          <ac:chgData name="Harry Delalis" userId="e707da9d-0989-49e5-9cfe-80f5fc5a8e78" providerId="ADAL" clId="{019419A2-9973-4246-B770-D378C33618EE}" dt="2025-01-14T09:05:41.997" v="10" actId="478"/>
-          <ac:spMkLst>
-            <pc:docMk/>
-            <pc:sldMk cId="2259676099" sldId="259"/>
-            <ac:spMk id="3" creationId="{17816DC9-88C2-8859-289D-4054989589B7}"/>
-          </ac:spMkLst>
-        </pc:spChg>
-        <pc:spChg chg="add del mod">
-          <ac:chgData name="Harry Delalis" userId="e707da9d-0989-49e5-9cfe-80f5fc5a8e78" providerId="ADAL" clId="{019419A2-9973-4246-B770-D378C33618EE}" dt="2025-01-14T09:06:09.514" v="40" actId="478"/>
-          <ac:spMkLst>
-            <pc:docMk/>
-            <pc:sldMk cId="2259676099" sldId="259"/>
-            <ac:spMk id="7" creationId="{7F596457-D459-D881-1947-B2ADFA740E38}"/>
-          </ac:spMkLst>
-        </pc:spChg>
-        <pc:graphicFrameChg chg="add mod modGraphic">
-          <ac:chgData name="Harry Delalis" userId="e707da9d-0989-49e5-9cfe-80f5fc5a8e78" providerId="ADAL" clId="{019419A2-9973-4246-B770-D378C33618EE}" dt="2025-01-14T09:30:21.748" v="531" actId="20577"/>
-          <ac:graphicFrameMkLst>
-            <pc:docMk/>
-            <pc:sldMk cId="2259676099" sldId="259"/>
-            <ac:graphicFrameMk id="8" creationId="{A916A793-3D69-DED2-E9A7-B68267DB3EC1}"/>
-          </ac:graphicFrameMkLst>
-        </pc:graphicFrameChg>
-        <pc:graphicFrameChg chg="add mod modGraphic">
-          <ac:chgData name="Harry Delalis" userId="e707da9d-0989-49e5-9cfe-80f5fc5a8e78" providerId="ADAL" clId="{019419A2-9973-4246-B770-D378C33618EE}" dt="2025-01-14T09:18:05.453" v="449" actId="14100"/>
-          <ac:graphicFrameMkLst>
-            <pc:docMk/>
-            <pc:sldMk cId="2259676099" sldId="259"/>
-            <ac:graphicFrameMk id="9" creationId="{5D3B5A4E-A7FE-89F0-6AB7-076354A3C6E0}"/>
-          </ac:graphicFrameMkLst>
-        </pc:graphicFrameChg>
-        <pc:graphicFrameChg chg="add mod modGraphic">
-          <ac:chgData name="Harry Delalis" userId="e707da9d-0989-49e5-9cfe-80f5fc5a8e78" providerId="ADAL" clId="{019419A2-9973-4246-B770-D378C33618EE}" dt="2025-01-14T09:19:23.422" v="522" actId="20577"/>
-          <ac:graphicFrameMkLst>
-            <pc:docMk/>
-            <pc:sldMk cId="2259676099" sldId="259"/>
-            <ac:graphicFrameMk id="10" creationId="{04B6638D-F677-DF4C-C504-F2B9FEE28CB2}"/>
-          </ac:graphicFrameMkLst>
-        </pc:graphicFrameChg>
       </pc:sldChg>
     </pc:docChg>
   </pc:docChgLst>
@@ -14404,7 +14403,7 @@
           <a:p>
             <a:fld id="{5412C376-BDD0-4F5E-823C-631F5729A383}" type="datetime1">
               <a:rPr lang="en-GB" smtClean="0"/>
-              <a:t>07/02/2025</a:t>
+              <a:t>17/03/2025</a:t>
             </a:fld>
             <a:endParaRPr lang="en-US" dirty="0"/>
           </a:p>
@@ -24247,7 +24246,7 @@
           <a:p>
             <a:fld id="{5412C376-BDD0-4F5E-823C-631F5729A383}" type="datetime1">
               <a:rPr lang="en-GB" smtClean="0"/>
-              <a:t>07/02/2025</a:t>
+              <a:t>17/03/2025</a:t>
             </a:fld>
             <a:endParaRPr lang="en-US" dirty="0"/>
           </a:p>
@@ -24732,7 +24731,7 @@
           <a:p>
             <a:fld id="{5412C376-BDD0-4F5E-823C-631F5729A383}" type="datetime1">
               <a:rPr lang="en-GB" smtClean="0"/>
-              <a:t>07/02/2025</a:t>
+              <a:t>17/03/2025</a:t>
             </a:fld>
             <a:endParaRPr lang="en-US" dirty="0"/>
           </a:p>
@@ -25383,7 +25382,7 @@
           <a:p>
             <a:fld id="{5412C376-BDD0-4F5E-823C-631F5729A383}" type="datetime1">
               <a:rPr lang="en-GB" smtClean="0"/>
-              <a:t>07/02/2025</a:t>
+              <a:t>17/03/2025</a:t>
             </a:fld>
             <a:endParaRPr lang="en-US" dirty="0"/>
           </a:p>
@@ -25888,7 +25887,7 @@
           <a:p>
             <a:fld id="{5412C376-BDD0-4F5E-823C-631F5729A383}" type="datetime1">
               <a:rPr lang="en-GB" smtClean="0"/>
-              <a:t>07/02/2025</a:t>
+              <a:t>17/03/2025</a:t>
             </a:fld>
             <a:endParaRPr lang="en-US" dirty="0"/>
           </a:p>
@@ -26460,7 +26459,7 @@
           <a:p>
             <a:fld id="{5412C376-BDD0-4F5E-823C-631F5729A383}" type="datetime1">
               <a:rPr lang="en-GB" smtClean="0"/>
-              <a:t>07/02/2025</a:t>
+              <a:t>17/03/2025</a:t>
             </a:fld>
             <a:endParaRPr lang="en-US" dirty="0"/>
           </a:p>
@@ -26740,7 +26739,7 @@
           <a:p>
             <a:fld id="{C601826A-7D2C-47F7-A44E-0D6D1BAEDEDA}" type="datetime1">
               <a:rPr lang="en-GB" smtClean="0"/>
-              <a:t>07/02/2025</a:t>
+              <a:t>17/03/2025</a:t>
             </a:fld>
             <a:endParaRPr lang="en-US"/>
           </a:p>
@@ -27285,7 +27284,7 @@
           <a:p>
             <a:r>
               <a:rPr lang="en-GB" dirty="0"/>
-              <a:t>Architecture</a:t>
+              <a:t>Architecture (update this with Django and IIS)</a:t>
             </a:r>
           </a:p>
         </p:txBody>
@@ -29012,1460 +29011,6 @@
           <p:cNvPr id="2" name="Title 1">
             <a:extLst>
               <a:ext uri="{FF2B5EF4-FFF2-40B4-BE49-F238E27FC236}">
-                <a16:creationId xmlns:a16="http://schemas.microsoft.com/office/drawing/2014/main" id="{C97A6B4F-F10F-8A5F-C1C9-7AA3C0532862}"/>
-              </a:ext>
-            </a:extLst>
-          </p:cNvPr>
-          <p:cNvSpPr>
-            <a:spLocks noGrp="1"/>
-          </p:cNvSpPr>
-          <p:nvPr>
-            <p:ph type="title"/>
-          </p:nvPr>
-        </p:nvSpPr>
-        <p:spPr/>
-        <p:txBody>
-          <a:bodyPr/>
-          <a:lstStyle/>
-          <a:p>
-            <a:r>
-              <a:rPr lang="en-GB" dirty="0"/>
-              <a:t>Options</a:t>
-            </a:r>
-          </a:p>
-        </p:txBody>
-      </p:sp>
-      <p:sp>
-        <p:nvSpPr>
-          <p:cNvPr id="4" name="Footer Placeholder 3">
-            <a:extLst>
-              <a:ext uri="{FF2B5EF4-FFF2-40B4-BE49-F238E27FC236}">
-                <a16:creationId xmlns:a16="http://schemas.microsoft.com/office/drawing/2014/main" id="{369DCADE-E3B4-D630-ED64-51EB8A3E6F9F}"/>
-              </a:ext>
-            </a:extLst>
-          </p:cNvPr>
-          <p:cNvSpPr>
-            <a:spLocks noGrp="1"/>
-          </p:cNvSpPr>
-          <p:nvPr>
-            <p:ph type="ftr" sz="quarter" idx="11"/>
-          </p:nvPr>
-        </p:nvSpPr>
-        <p:spPr/>
-        <p:txBody>
-          <a:bodyPr/>
-          <a:lstStyle/>
-          <a:p>
-            <a:r>
-              <a:rPr lang="en-US"/>
-              <a:t>Company Confidential</a:t>
-            </a:r>
-            <a:endParaRPr lang="en-US" dirty="0"/>
-          </a:p>
-        </p:txBody>
-      </p:sp>
-      <p:sp>
-        <p:nvSpPr>
-          <p:cNvPr id="5" name="Date Placeholder 4">
-            <a:extLst>
-              <a:ext uri="{FF2B5EF4-FFF2-40B4-BE49-F238E27FC236}">
-                <a16:creationId xmlns:a16="http://schemas.microsoft.com/office/drawing/2014/main" id="{E41C313E-5A36-FD85-F9CA-F8531936B700}"/>
-              </a:ext>
-            </a:extLst>
-          </p:cNvPr>
-          <p:cNvSpPr>
-            <a:spLocks noGrp="1"/>
-          </p:cNvSpPr>
-          <p:nvPr>
-            <p:ph type="dt" sz="half" idx="10"/>
-          </p:nvPr>
-        </p:nvSpPr>
-        <p:spPr/>
-        <p:txBody>
-          <a:bodyPr/>
-          <a:lstStyle/>
-          <a:p>
-            <a:fld id="{5412C376-BDD0-4F5E-823C-631F5729A383}" type="datetime1">
-              <a:rPr lang="en-GB" smtClean="0"/>
-              <a:t>07/02/2025</a:t>
-            </a:fld>
-            <a:endParaRPr lang="en-US" dirty="0"/>
-          </a:p>
-        </p:txBody>
-      </p:sp>
-      <p:sp>
-        <p:nvSpPr>
-          <p:cNvPr id="6" name="Slide Number Placeholder 5">
-            <a:extLst>
-              <a:ext uri="{FF2B5EF4-FFF2-40B4-BE49-F238E27FC236}">
-                <a16:creationId xmlns:a16="http://schemas.microsoft.com/office/drawing/2014/main" id="{F04DB652-5A02-0D0B-1593-76B8A68A5FBA}"/>
-              </a:ext>
-            </a:extLst>
-          </p:cNvPr>
-          <p:cNvSpPr>
-            <a:spLocks noGrp="1"/>
-          </p:cNvSpPr>
-          <p:nvPr>
-            <p:ph type="sldNum" sz="quarter" idx="12"/>
-          </p:nvPr>
-        </p:nvSpPr>
-        <p:spPr/>
-        <p:txBody>
-          <a:bodyPr/>
-          <a:lstStyle/>
-          <a:p>
-            <a:fld id="{263CF578-CC50-7F42-93DE-EF110206E425}" type="slidenum">
-              <a:rPr lang="en-US" smtClean="0"/>
-              <a:pPr/>
-              <a:t>3</a:t>
-            </a:fld>
-            <a:endParaRPr lang="en-US" dirty="0"/>
-          </a:p>
-        </p:txBody>
-      </p:sp>
-      <p:graphicFrame>
-        <p:nvGraphicFramePr>
-          <p:cNvPr id="8" name="Table 7">
-            <a:extLst>
-              <a:ext uri="{FF2B5EF4-FFF2-40B4-BE49-F238E27FC236}">
-                <a16:creationId xmlns:a16="http://schemas.microsoft.com/office/drawing/2014/main" id="{A916A793-3D69-DED2-E9A7-B68267DB3EC1}"/>
-              </a:ext>
-            </a:extLst>
-          </p:cNvPr>
-          <p:cNvGraphicFramePr>
-            <a:graphicFrameLocks noGrp="1"/>
-          </p:cNvGraphicFramePr>
-          <p:nvPr>
-            <p:extLst>
-              <p:ext uri="{D42A27DB-BD31-4B8C-83A1-F6EECF244321}">
-                <p14:modId xmlns:p14="http://schemas.microsoft.com/office/powerpoint/2010/main" val="1597738161"/>
-              </p:ext>
-            </p:extLst>
-          </p:nvPr>
-        </p:nvGraphicFramePr>
-        <p:xfrm>
-          <a:off x="107318" y="1008345"/>
-          <a:ext cx="6542180" cy="1516374"/>
-        </p:xfrm>
-        <a:graphic>
-          <a:graphicData uri="http://schemas.openxmlformats.org/drawingml/2006/table">
-            <a:tbl>
-              <a:tblPr firstRow="1" bandRow="1">
-                <a:tableStyleId>{5C22544A-7EE6-4342-B048-85BDC9FD1C3A}</a:tableStyleId>
-              </a:tblPr>
-              <a:tblGrid>
-                <a:gridCol w="1635545">
-                  <a:extLst>
-                    <a:ext uri="{9D8B030D-6E8A-4147-A177-3AD203B41FA5}">
-                      <a16:colId xmlns:a16="http://schemas.microsoft.com/office/drawing/2014/main" val="1850391757"/>
-                    </a:ext>
-                  </a:extLst>
-                </a:gridCol>
-                <a:gridCol w="1635545">
-                  <a:extLst>
-                    <a:ext uri="{9D8B030D-6E8A-4147-A177-3AD203B41FA5}">
-                      <a16:colId xmlns:a16="http://schemas.microsoft.com/office/drawing/2014/main" val="4213036188"/>
-                    </a:ext>
-                  </a:extLst>
-                </a:gridCol>
-                <a:gridCol w="1635545">
-                  <a:extLst>
-                    <a:ext uri="{9D8B030D-6E8A-4147-A177-3AD203B41FA5}">
-                      <a16:colId xmlns:a16="http://schemas.microsoft.com/office/drawing/2014/main" val="1427325391"/>
-                    </a:ext>
-                  </a:extLst>
-                </a:gridCol>
-                <a:gridCol w="1635545">
-                  <a:extLst>
-                    <a:ext uri="{9D8B030D-6E8A-4147-A177-3AD203B41FA5}">
-                      <a16:colId xmlns:a16="http://schemas.microsoft.com/office/drawing/2014/main" val="3235790415"/>
-                    </a:ext>
-                  </a:extLst>
-                </a:gridCol>
-              </a:tblGrid>
-              <a:tr h="249261">
-                <a:tc>
-                  <a:txBody>
-                    <a:bodyPr/>
-                    <a:lstStyle/>
-                    <a:p>
-                      <a:pPr marL="0" marR="0" lvl="0" indent="0" algn="ctr" defTabSz="914400" rtl="0" eaLnBrk="1" fontAlgn="auto" latinLnBrk="0" hangingPunct="1">
-                        <a:lnSpc>
-                          <a:spcPct val="100000"/>
-                        </a:lnSpc>
-                        <a:spcBef>
-                          <a:spcPts val="0"/>
-                        </a:spcBef>
-                        <a:spcAft>
-                          <a:spcPts val="0"/>
-                        </a:spcAft>
-                        <a:buClrTx/>
-                        <a:buSzTx/>
-                        <a:buFontTx/>
-                        <a:buNone/>
-                        <a:tabLst/>
-                        <a:defRPr/>
-                      </a:pPr>
-                      <a:r>
-                        <a:rPr lang="en-GB" sz="1600" dirty="0"/>
-                        <a:t>Transmission</a:t>
-                      </a:r>
-                    </a:p>
-                  </a:txBody>
-                  <a:tcPr/>
-                </a:tc>
-                <a:tc>
-                  <a:txBody>
-                    <a:bodyPr/>
-                    <a:lstStyle/>
-                    <a:p>
-                      <a:pPr marL="0" marR="0" lvl="0" indent="0" algn="ctr" defTabSz="914400" rtl="0" eaLnBrk="1" fontAlgn="auto" latinLnBrk="0" hangingPunct="1">
-                        <a:lnSpc>
-                          <a:spcPct val="100000"/>
-                        </a:lnSpc>
-                        <a:spcBef>
-                          <a:spcPts val="0"/>
-                        </a:spcBef>
-                        <a:spcAft>
-                          <a:spcPts val="0"/>
-                        </a:spcAft>
-                        <a:buClrTx/>
-                        <a:buSzTx/>
-                        <a:buFontTx/>
-                        <a:buNone/>
-                        <a:tabLst/>
-                        <a:defRPr/>
-                      </a:pPr>
-                      <a:r>
-                        <a:rPr lang="en-GB" sz="1600" dirty="0"/>
-                        <a:t>option1</a:t>
-                      </a:r>
-                    </a:p>
-                  </a:txBody>
-                  <a:tcPr/>
-                </a:tc>
-                <a:tc>
-                  <a:txBody>
-                    <a:bodyPr/>
-                    <a:lstStyle/>
-                    <a:p>
-                      <a:pPr marL="0" marR="0" lvl="0" indent="0" algn="ctr" defTabSz="914400" rtl="0" eaLnBrk="1" fontAlgn="auto" latinLnBrk="0" hangingPunct="1">
-                        <a:lnSpc>
-                          <a:spcPct val="100000"/>
-                        </a:lnSpc>
-                        <a:spcBef>
-                          <a:spcPts val="0"/>
-                        </a:spcBef>
-                        <a:spcAft>
-                          <a:spcPts val="0"/>
-                        </a:spcAft>
-                        <a:buClrTx/>
-                        <a:buSzTx/>
-                        <a:buFontTx/>
-                        <a:buNone/>
-                        <a:tabLst/>
-                        <a:defRPr/>
-                      </a:pPr>
-                      <a:r>
-                        <a:rPr lang="en-GB" sz="1600" dirty="0"/>
-                        <a:t>option2</a:t>
-                      </a:r>
-                    </a:p>
-                  </a:txBody>
-                  <a:tcPr/>
-                </a:tc>
-                <a:tc>
-                  <a:txBody>
-                    <a:bodyPr/>
-                    <a:lstStyle/>
-                    <a:p>
-                      <a:pPr marL="0" marR="0" lvl="0" indent="0" algn="ctr" defTabSz="914400" rtl="0" eaLnBrk="1" fontAlgn="auto" latinLnBrk="0" hangingPunct="1">
-                        <a:lnSpc>
-                          <a:spcPct val="100000"/>
-                        </a:lnSpc>
-                        <a:spcBef>
-                          <a:spcPts val="0"/>
-                        </a:spcBef>
-                        <a:spcAft>
-                          <a:spcPts val="0"/>
-                        </a:spcAft>
-                        <a:buClrTx/>
-                        <a:buSzTx/>
-                        <a:buFontTx/>
-                        <a:buNone/>
-                        <a:tabLst/>
-                        <a:defRPr/>
-                      </a:pPr>
-                      <a:r>
-                        <a:rPr lang="en-GB" sz="1600" dirty="0"/>
-                        <a:t>option3</a:t>
-                      </a:r>
-                    </a:p>
-                  </a:txBody>
-                  <a:tcPr/>
-                </a:tc>
-                <a:extLst>
-                  <a:ext uri="{0D108BD9-81ED-4DB2-BD59-A6C34878D82A}">
-                    <a16:rowId xmlns:a16="http://schemas.microsoft.com/office/drawing/2014/main" val="1187130106"/>
-                  </a:ext>
-                </a:extLst>
-              </a:tr>
-              <a:tr h="331467">
-                <a:tc>
-                  <a:txBody>
-                    <a:bodyPr/>
-                    <a:lstStyle/>
-                    <a:p>
-                      <a:pPr marL="0" marR="0" lvl="0" indent="0" algn="l" defTabSz="914400" rtl="0" eaLnBrk="1" fontAlgn="auto" latinLnBrk="0" hangingPunct="1">
-                        <a:lnSpc>
-                          <a:spcPct val="100000"/>
-                        </a:lnSpc>
-                        <a:spcBef>
-                          <a:spcPts val="0"/>
-                        </a:spcBef>
-                        <a:spcAft>
-                          <a:spcPts val="0"/>
-                        </a:spcAft>
-                        <a:buClrTx/>
-                        <a:buSzTx/>
-                        <a:buFontTx/>
-                        <a:buNone/>
-                        <a:tabLst/>
-                        <a:defRPr/>
-                      </a:pPr>
-                      <a:r>
-                        <a:rPr lang="en-GB" sz="1400" dirty="0"/>
-                        <a:t>Polariser</a:t>
-                      </a:r>
-                    </a:p>
-                  </a:txBody>
-                  <a:tcPr/>
-                </a:tc>
-                <a:tc>
-                  <a:txBody>
-                    <a:bodyPr/>
-                    <a:lstStyle/>
-                    <a:p>
-                      <a:pPr marL="0" marR="0" lvl="0" indent="0" algn="l" defTabSz="914400" rtl="0" eaLnBrk="1" fontAlgn="auto" latinLnBrk="0" hangingPunct="1">
-                        <a:lnSpc>
-                          <a:spcPct val="100000"/>
-                        </a:lnSpc>
-                        <a:spcBef>
-                          <a:spcPts val="0"/>
-                        </a:spcBef>
-                        <a:spcAft>
-                          <a:spcPts val="0"/>
-                        </a:spcAft>
-                        <a:buClrTx/>
-                        <a:buSzTx/>
-                        <a:buFontTx/>
-                        <a:buNone/>
-                        <a:tabLst/>
-                        <a:defRPr/>
-                      </a:pPr>
-                      <a:r>
-                        <a:rPr lang="en-GB" sz="1400" dirty="0"/>
-                        <a:t>Single</a:t>
-                      </a:r>
-                    </a:p>
-                  </a:txBody>
-                  <a:tcPr/>
-                </a:tc>
-                <a:tc>
-                  <a:txBody>
-                    <a:bodyPr/>
-                    <a:lstStyle/>
-                    <a:p>
-                      <a:pPr marL="0" marR="0" lvl="0" indent="0" algn="l" defTabSz="914400" rtl="0" eaLnBrk="1" fontAlgn="auto" latinLnBrk="0" hangingPunct="1">
-                        <a:lnSpc>
-                          <a:spcPct val="100000"/>
-                        </a:lnSpc>
-                        <a:spcBef>
-                          <a:spcPts val="0"/>
-                        </a:spcBef>
-                        <a:spcAft>
-                          <a:spcPts val="0"/>
-                        </a:spcAft>
-                        <a:buClrTx/>
-                        <a:buSzTx/>
-                        <a:buFontTx/>
-                        <a:buNone/>
-                        <a:tabLst/>
-                        <a:defRPr/>
-                      </a:pPr>
-                      <a:r>
-                        <a:rPr lang="en-GB" sz="1400" dirty="0"/>
-                        <a:t>Double</a:t>
-                      </a:r>
-                    </a:p>
-                  </a:txBody>
-                  <a:tcPr/>
-                </a:tc>
-                <a:tc>
-                  <a:txBody>
-                    <a:bodyPr/>
-                    <a:lstStyle/>
-                    <a:p>
-                      <a:pPr marL="0" marR="0" lvl="0" indent="0" algn="l" defTabSz="914400" rtl="0" eaLnBrk="1" fontAlgn="auto" latinLnBrk="0" hangingPunct="1">
-                        <a:lnSpc>
-                          <a:spcPct val="100000"/>
-                        </a:lnSpc>
-                        <a:spcBef>
-                          <a:spcPts val="0"/>
-                        </a:spcBef>
-                        <a:spcAft>
-                          <a:spcPts val="0"/>
-                        </a:spcAft>
-                        <a:buClrTx/>
-                        <a:buSzTx/>
-                        <a:buFontTx/>
-                        <a:buNone/>
-                        <a:tabLst/>
-                        <a:defRPr/>
-                      </a:pPr>
-                      <a:r>
-                        <a:rPr lang="en-GB" sz="1400" dirty="0"/>
-                        <a:t>orientation</a:t>
-                      </a:r>
-                    </a:p>
-                  </a:txBody>
-                  <a:tcPr/>
-                </a:tc>
-                <a:extLst>
-                  <a:ext uri="{0D108BD9-81ED-4DB2-BD59-A6C34878D82A}">
-                    <a16:rowId xmlns:a16="http://schemas.microsoft.com/office/drawing/2014/main" val="2899786032"/>
-                  </a:ext>
-                </a:extLst>
-              </a:tr>
-              <a:tr h="331467">
-                <a:tc>
-                  <a:txBody>
-                    <a:bodyPr/>
-                    <a:lstStyle/>
-                    <a:p>
-                      <a:pPr marL="0" marR="0" lvl="0" indent="0" algn="l" defTabSz="914400" rtl="0" eaLnBrk="1" fontAlgn="auto" latinLnBrk="0" hangingPunct="1">
-                        <a:lnSpc>
-                          <a:spcPct val="100000"/>
-                        </a:lnSpc>
-                        <a:spcBef>
-                          <a:spcPts val="0"/>
-                        </a:spcBef>
-                        <a:spcAft>
-                          <a:spcPts val="0"/>
-                        </a:spcAft>
-                        <a:buClrTx/>
-                        <a:buSzTx/>
-                        <a:buFontTx/>
-                        <a:buNone/>
-                        <a:tabLst/>
-                        <a:defRPr/>
-                      </a:pPr>
-                      <a:r>
-                        <a:rPr lang="en-GB" sz="1400" dirty="0"/>
-                        <a:t>Voltage</a:t>
-                      </a:r>
-                    </a:p>
-                  </a:txBody>
-                  <a:tcPr/>
-                </a:tc>
-                <a:tc>
-                  <a:txBody>
-                    <a:bodyPr/>
-                    <a:lstStyle/>
-                    <a:p>
-                      <a:pPr marL="0" marR="0" lvl="0" indent="0" algn="l" defTabSz="914400" rtl="0" eaLnBrk="1" fontAlgn="auto" latinLnBrk="0" hangingPunct="1">
-                        <a:lnSpc>
-                          <a:spcPct val="100000"/>
-                        </a:lnSpc>
-                        <a:spcBef>
-                          <a:spcPts val="0"/>
-                        </a:spcBef>
-                        <a:spcAft>
-                          <a:spcPts val="0"/>
-                        </a:spcAft>
-                        <a:buClrTx/>
-                        <a:buSzTx/>
-                        <a:buFontTx/>
-                        <a:buNone/>
-                        <a:tabLst/>
-                        <a:defRPr/>
-                      </a:pPr>
-                      <a:r>
-                        <a:rPr lang="en-GB" sz="1400" dirty="0"/>
-                        <a:t>Range</a:t>
-                      </a:r>
-                    </a:p>
-                  </a:txBody>
-                  <a:tcPr/>
-                </a:tc>
-                <a:tc>
-                  <a:txBody>
-                    <a:bodyPr/>
-                    <a:lstStyle/>
-                    <a:p>
-                      <a:pPr marL="0" marR="0" lvl="0" indent="0" algn="l" defTabSz="914400" rtl="0" eaLnBrk="1" fontAlgn="auto" latinLnBrk="0" hangingPunct="1">
-                        <a:lnSpc>
-                          <a:spcPct val="100000"/>
-                        </a:lnSpc>
-                        <a:spcBef>
-                          <a:spcPts val="0"/>
-                        </a:spcBef>
-                        <a:spcAft>
-                          <a:spcPts val="0"/>
-                        </a:spcAft>
-                        <a:buClrTx/>
-                        <a:buSzTx/>
-                        <a:buFontTx/>
-                        <a:buNone/>
-                        <a:tabLst/>
-                        <a:defRPr/>
-                      </a:pPr>
-                      <a:r>
-                        <a:rPr lang="en-GB" sz="1400" dirty="0"/>
-                        <a:t>Single Points</a:t>
-                      </a:r>
-                    </a:p>
-                  </a:txBody>
-                  <a:tcPr/>
-                </a:tc>
-                <a:tc>
-                  <a:txBody>
-                    <a:bodyPr/>
-                    <a:lstStyle/>
-                    <a:p>
-                      <a:pPr marL="0" marR="0" lvl="0" indent="0" algn="l" defTabSz="914400" rtl="0" eaLnBrk="1" fontAlgn="auto" latinLnBrk="0" hangingPunct="1">
-                        <a:lnSpc>
-                          <a:spcPct val="100000"/>
-                        </a:lnSpc>
-                        <a:spcBef>
-                          <a:spcPts val="0"/>
-                        </a:spcBef>
-                        <a:spcAft>
-                          <a:spcPts val="0"/>
-                        </a:spcAft>
-                        <a:buClrTx/>
-                        <a:buSzTx/>
-                        <a:buFontTx/>
-                        <a:buNone/>
-                        <a:tabLst/>
-                        <a:defRPr/>
-                      </a:pPr>
-                      <a:endParaRPr lang="en-GB" sz="1400" dirty="0"/>
-                    </a:p>
-                  </a:txBody>
-                  <a:tcPr/>
-                </a:tc>
-                <a:extLst>
-                  <a:ext uri="{0D108BD9-81ED-4DB2-BD59-A6C34878D82A}">
-                    <a16:rowId xmlns:a16="http://schemas.microsoft.com/office/drawing/2014/main" val="764354390"/>
-                  </a:ext>
-                </a:extLst>
-              </a:tr>
-              <a:tr h="249261">
-                <a:tc>
-                  <a:txBody>
-                    <a:bodyPr/>
-                    <a:lstStyle/>
-                    <a:p>
-                      <a:r>
-                        <a:rPr lang="en-GB" sz="1400" dirty="0"/>
-                        <a:t>Tool</a:t>
-                      </a:r>
-                    </a:p>
-                  </a:txBody>
-                  <a:tcPr/>
-                </a:tc>
-                <a:tc>
-                  <a:txBody>
-                    <a:bodyPr/>
-                    <a:lstStyle/>
-                    <a:p>
-                      <a:r>
-                        <a:rPr lang="en-GB" sz="1400" dirty="0"/>
-                        <a:t>Konica Minolta CS-160S</a:t>
-                      </a:r>
-                    </a:p>
-                  </a:txBody>
-                  <a:tcPr/>
-                </a:tc>
-                <a:tc>
-                  <a:txBody>
-                    <a:bodyPr/>
-                    <a:lstStyle/>
-                    <a:p>
-                      <a:r>
-                        <a:rPr lang="en-GB" sz="1400" dirty="0"/>
-                        <a:t>Laser-Photodiode</a:t>
-                      </a:r>
-                    </a:p>
-                  </a:txBody>
-                  <a:tcPr/>
-                </a:tc>
-                <a:tc>
-                  <a:txBody>
-                    <a:bodyPr/>
-                    <a:lstStyle/>
-                    <a:p>
-                      <a:endParaRPr lang="en-GB" sz="1400" dirty="0"/>
-                    </a:p>
-                  </a:txBody>
-                  <a:tcPr/>
-                </a:tc>
-                <a:extLst>
-                  <a:ext uri="{0D108BD9-81ED-4DB2-BD59-A6C34878D82A}">
-                    <a16:rowId xmlns:a16="http://schemas.microsoft.com/office/drawing/2014/main" val="630006285"/>
-                  </a:ext>
-                </a:extLst>
-              </a:tr>
-            </a:tbl>
-          </a:graphicData>
-        </a:graphic>
-      </p:graphicFrame>
-      <p:graphicFrame>
-        <p:nvGraphicFramePr>
-          <p:cNvPr id="9" name="Table 8">
-            <a:extLst>
-              <a:ext uri="{FF2B5EF4-FFF2-40B4-BE49-F238E27FC236}">
-                <a16:creationId xmlns:a16="http://schemas.microsoft.com/office/drawing/2014/main" id="{5D3B5A4E-A7FE-89F0-6AB7-076354A3C6E0}"/>
-              </a:ext>
-            </a:extLst>
-          </p:cNvPr>
-          <p:cNvGraphicFramePr>
-            <a:graphicFrameLocks noGrp="1"/>
-          </p:cNvGraphicFramePr>
-          <p:nvPr>
-            <p:extLst>
-              <p:ext uri="{D42A27DB-BD31-4B8C-83A1-F6EECF244321}">
-                <p14:modId xmlns:p14="http://schemas.microsoft.com/office/powerpoint/2010/main" val="425186788"/>
-              </p:ext>
-            </p:extLst>
-          </p:nvPr>
-        </p:nvGraphicFramePr>
-        <p:xfrm>
-          <a:off x="107319" y="2633198"/>
-          <a:ext cx="4913256" cy="1303014"/>
-        </p:xfrm>
-        <a:graphic>
-          <a:graphicData uri="http://schemas.openxmlformats.org/drawingml/2006/table">
-            <a:tbl>
-              <a:tblPr firstRow="1" bandRow="1">
-                <a:tableStyleId>{5C22544A-7EE6-4342-B048-85BDC9FD1C3A}</a:tableStyleId>
-              </a:tblPr>
-              <a:tblGrid>
-                <a:gridCol w="1637752">
-                  <a:extLst>
-                    <a:ext uri="{9D8B030D-6E8A-4147-A177-3AD203B41FA5}">
-                      <a16:colId xmlns:a16="http://schemas.microsoft.com/office/drawing/2014/main" val="1850391757"/>
-                    </a:ext>
-                  </a:extLst>
-                </a:gridCol>
-                <a:gridCol w="1637752">
-                  <a:extLst>
-                    <a:ext uri="{9D8B030D-6E8A-4147-A177-3AD203B41FA5}">
-                      <a16:colId xmlns:a16="http://schemas.microsoft.com/office/drawing/2014/main" val="4213036188"/>
-                    </a:ext>
-                  </a:extLst>
-                </a:gridCol>
-                <a:gridCol w="1637752">
-                  <a:extLst>
-                    <a:ext uri="{9D8B030D-6E8A-4147-A177-3AD203B41FA5}">
-                      <a16:colId xmlns:a16="http://schemas.microsoft.com/office/drawing/2014/main" val="1427325391"/>
-                    </a:ext>
-                  </a:extLst>
-                </a:gridCol>
-              </a:tblGrid>
-              <a:tr h="249261">
-                <a:tc>
-                  <a:txBody>
-                    <a:bodyPr/>
-                    <a:lstStyle/>
-                    <a:p>
-                      <a:pPr marL="0" marR="0" lvl="0" indent="0" algn="ctr" defTabSz="914400" rtl="0" eaLnBrk="1" fontAlgn="auto" latinLnBrk="0" hangingPunct="1">
-                        <a:lnSpc>
-                          <a:spcPct val="100000"/>
-                        </a:lnSpc>
-                        <a:spcBef>
-                          <a:spcPts val="0"/>
-                        </a:spcBef>
-                        <a:spcAft>
-                          <a:spcPts val="0"/>
-                        </a:spcAft>
-                        <a:buClrTx/>
-                        <a:buSzTx/>
-                        <a:buFontTx/>
-                        <a:buNone/>
-                        <a:tabLst/>
-                        <a:defRPr/>
-                      </a:pPr>
-                      <a:r>
-                        <a:rPr lang="en-GB" sz="1600" dirty="0"/>
-                        <a:t>Switching Speed</a:t>
-                      </a:r>
-                    </a:p>
-                  </a:txBody>
-                  <a:tcPr/>
-                </a:tc>
-                <a:tc>
-                  <a:txBody>
-                    <a:bodyPr/>
-                    <a:lstStyle/>
-                    <a:p>
-                      <a:pPr marL="0" marR="0" lvl="0" indent="0" algn="ctr" defTabSz="914400" rtl="0" eaLnBrk="1" fontAlgn="auto" latinLnBrk="0" hangingPunct="1">
-                        <a:lnSpc>
-                          <a:spcPct val="100000"/>
-                        </a:lnSpc>
-                        <a:spcBef>
-                          <a:spcPts val="0"/>
-                        </a:spcBef>
-                        <a:spcAft>
-                          <a:spcPts val="0"/>
-                        </a:spcAft>
-                        <a:buClrTx/>
-                        <a:buSzTx/>
-                        <a:buFontTx/>
-                        <a:buNone/>
-                        <a:tabLst/>
-                        <a:defRPr/>
-                      </a:pPr>
-                      <a:r>
-                        <a:rPr lang="en-GB" sz="1600" dirty="0"/>
-                        <a:t>option1</a:t>
-                      </a:r>
-                    </a:p>
-                  </a:txBody>
-                  <a:tcPr/>
-                </a:tc>
-                <a:tc>
-                  <a:txBody>
-                    <a:bodyPr/>
-                    <a:lstStyle/>
-                    <a:p>
-                      <a:pPr marL="0" marR="0" lvl="0" indent="0" algn="ctr" defTabSz="914400" rtl="0" eaLnBrk="1" fontAlgn="auto" latinLnBrk="0" hangingPunct="1">
-                        <a:lnSpc>
-                          <a:spcPct val="100000"/>
-                        </a:lnSpc>
-                        <a:spcBef>
-                          <a:spcPts val="0"/>
-                        </a:spcBef>
-                        <a:spcAft>
-                          <a:spcPts val="0"/>
-                        </a:spcAft>
-                        <a:buClrTx/>
-                        <a:buSzTx/>
-                        <a:buFontTx/>
-                        <a:buNone/>
-                        <a:tabLst/>
-                        <a:defRPr/>
-                      </a:pPr>
-                      <a:r>
-                        <a:rPr lang="en-GB" sz="1600" dirty="0"/>
-                        <a:t>option2</a:t>
-                      </a:r>
-                    </a:p>
-                  </a:txBody>
-                  <a:tcPr/>
-                </a:tc>
-                <a:extLst>
-                  <a:ext uri="{0D108BD9-81ED-4DB2-BD59-A6C34878D82A}">
-                    <a16:rowId xmlns:a16="http://schemas.microsoft.com/office/drawing/2014/main" val="1187130106"/>
-                  </a:ext>
-                </a:extLst>
-              </a:tr>
-              <a:tr h="331467">
-                <a:tc>
-                  <a:txBody>
-                    <a:bodyPr/>
-                    <a:lstStyle/>
-                    <a:p>
-                      <a:pPr marL="0" marR="0" lvl="0" indent="0" algn="l" defTabSz="914400" rtl="0" eaLnBrk="1" fontAlgn="auto" latinLnBrk="0" hangingPunct="1">
-                        <a:lnSpc>
-                          <a:spcPct val="100000"/>
-                        </a:lnSpc>
-                        <a:spcBef>
-                          <a:spcPts val="0"/>
-                        </a:spcBef>
-                        <a:spcAft>
-                          <a:spcPts val="0"/>
-                        </a:spcAft>
-                        <a:buClrTx/>
-                        <a:buSzTx/>
-                        <a:buFontTx/>
-                        <a:buNone/>
-                        <a:tabLst/>
-                        <a:defRPr/>
-                      </a:pPr>
-                      <a:r>
-                        <a:rPr lang="en-GB" sz="1400" dirty="0"/>
-                        <a:t>Polariser</a:t>
-                      </a:r>
-                    </a:p>
-                  </a:txBody>
-                  <a:tcPr/>
-                </a:tc>
-                <a:tc>
-                  <a:txBody>
-                    <a:bodyPr/>
-                    <a:lstStyle/>
-                    <a:p>
-                      <a:pPr marL="0" marR="0" lvl="0" indent="0" algn="l" defTabSz="914400" rtl="0" eaLnBrk="1" fontAlgn="auto" latinLnBrk="0" hangingPunct="1">
-                        <a:lnSpc>
-                          <a:spcPct val="100000"/>
-                        </a:lnSpc>
-                        <a:spcBef>
-                          <a:spcPts val="0"/>
-                        </a:spcBef>
-                        <a:spcAft>
-                          <a:spcPts val="0"/>
-                        </a:spcAft>
-                        <a:buClrTx/>
-                        <a:buSzTx/>
-                        <a:buFontTx/>
-                        <a:buNone/>
-                        <a:tabLst/>
-                        <a:defRPr/>
-                      </a:pPr>
-                      <a:r>
-                        <a:rPr lang="en-GB" sz="1400" dirty="0"/>
-                        <a:t>Single</a:t>
-                      </a:r>
-                    </a:p>
-                  </a:txBody>
-                  <a:tcPr/>
-                </a:tc>
-                <a:tc>
-                  <a:txBody>
-                    <a:bodyPr/>
-                    <a:lstStyle/>
-                    <a:p>
-                      <a:pPr marL="0" marR="0" lvl="0" indent="0" algn="l" defTabSz="914400" rtl="0" eaLnBrk="1" fontAlgn="auto" latinLnBrk="0" hangingPunct="1">
-                        <a:lnSpc>
-                          <a:spcPct val="100000"/>
-                        </a:lnSpc>
-                        <a:spcBef>
-                          <a:spcPts val="0"/>
-                        </a:spcBef>
-                        <a:spcAft>
-                          <a:spcPts val="0"/>
-                        </a:spcAft>
-                        <a:buClrTx/>
-                        <a:buSzTx/>
-                        <a:buFontTx/>
-                        <a:buNone/>
-                        <a:tabLst/>
-                        <a:defRPr/>
-                      </a:pPr>
-                      <a:r>
-                        <a:rPr lang="en-GB" sz="1400" dirty="0"/>
-                        <a:t>Double</a:t>
-                      </a:r>
-                    </a:p>
-                  </a:txBody>
-                  <a:tcPr/>
-                </a:tc>
-                <a:extLst>
-                  <a:ext uri="{0D108BD9-81ED-4DB2-BD59-A6C34878D82A}">
-                    <a16:rowId xmlns:a16="http://schemas.microsoft.com/office/drawing/2014/main" val="2899786032"/>
-                  </a:ext>
-                </a:extLst>
-              </a:tr>
-              <a:tr h="331467">
-                <a:tc>
-                  <a:txBody>
-                    <a:bodyPr/>
-                    <a:lstStyle/>
-                    <a:p>
-                      <a:pPr marL="0" marR="0" lvl="0" indent="0" algn="l" defTabSz="914400" rtl="0" eaLnBrk="1" fontAlgn="auto" latinLnBrk="0" hangingPunct="1">
-                        <a:lnSpc>
-                          <a:spcPct val="100000"/>
-                        </a:lnSpc>
-                        <a:spcBef>
-                          <a:spcPts val="0"/>
-                        </a:spcBef>
-                        <a:spcAft>
-                          <a:spcPts val="0"/>
-                        </a:spcAft>
-                        <a:buClrTx/>
-                        <a:buSzTx/>
-                        <a:buFontTx/>
-                        <a:buNone/>
-                        <a:tabLst/>
-                        <a:defRPr/>
-                      </a:pPr>
-                      <a:r>
-                        <a:rPr lang="en-GB" sz="1400" dirty="0"/>
-                        <a:t>Voltage</a:t>
-                      </a:r>
-                    </a:p>
-                  </a:txBody>
-                  <a:tcPr/>
-                </a:tc>
-                <a:tc>
-                  <a:txBody>
-                    <a:bodyPr/>
-                    <a:lstStyle/>
-                    <a:p>
-                      <a:pPr marL="0" marR="0" lvl="0" indent="0" algn="l" defTabSz="914400" rtl="0" eaLnBrk="1" fontAlgn="auto" latinLnBrk="0" hangingPunct="1">
-                        <a:lnSpc>
-                          <a:spcPct val="100000"/>
-                        </a:lnSpc>
-                        <a:spcBef>
-                          <a:spcPts val="0"/>
-                        </a:spcBef>
-                        <a:spcAft>
-                          <a:spcPts val="0"/>
-                        </a:spcAft>
-                        <a:buClrTx/>
-                        <a:buSzTx/>
-                        <a:buFontTx/>
-                        <a:buNone/>
-                        <a:tabLst/>
-                        <a:defRPr/>
-                      </a:pPr>
-                      <a:r>
-                        <a:rPr lang="en-GB" sz="1400" dirty="0"/>
-                        <a:t>Single points</a:t>
-                      </a:r>
-                    </a:p>
-                  </a:txBody>
-                  <a:tcPr/>
-                </a:tc>
-                <a:tc>
-                  <a:txBody>
-                    <a:bodyPr/>
-                    <a:lstStyle/>
-                    <a:p>
-                      <a:pPr marL="0" marR="0" lvl="0" indent="0" algn="l" defTabSz="914400" rtl="0" eaLnBrk="1" fontAlgn="auto" latinLnBrk="0" hangingPunct="1">
-                        <a:lnSpc>
-                          <a:spcPct val="100000"/>
-                        </a:lnSpc>
-                        <a:spcBef>
-                          <a:spcPts val="0"/>
-                        </a:spcBef>
-                        <a:spcAft>
-                          <a:spcPts val="0"/>
-                        </a:spcAft>
-                        <a:buClrTx/>
-                        <a:buSzTx/>
-                        <a:buFontTx/>
-                        <a:buNone/>
-                        <a:tabLst/>
-                        <a:defRPr/>
-                      </a:pPr>
-                      <a:endParaRPr lang="en-GB" sz="1400" dirty="0"/>
-                    </a:p>
-                  </a:txBody>
-                  <a:tcPr/>
-                </a:tc>
-                <a:extLst>
-                  <a:ext uri="{0D108BD9-81ED-4DB2-BD59-A6C34878D82A}">
-                    <a16:rowId xmlns:a16="http://schemas.microsoft.com/office/drawing/2014/main" val="764354390"/>
-                  </a:ext>
-                </a:extLst>
-              </a:tr>
-              <a:tr h="249261">
-                <a:tc>
-                  <a:txBody>
-                    <a:bodyPr/>
-                    <a:lstStyle/>
-                    <a:p>
-                      <a:r>
-                        <a:rPr lang="en-GB" sz="1400" dirty="0"/>
-                        <a:t>Tool</a:t>
-                      </a:r>
-                    </a:p>
-                  </a:txBody>
-                  <a:tcPr/>
-                </a:tc>
-                <a:tc>
-                  <a:txBody>
-                    <a:bodyPr/>
-                    <a:lstStyle/>
-                    <a:p>
-                      <a:pPr marL="0" marR="0" lvl="0" indent="0" algn="l" defTabSz="914400" rtl="0" eaLnBrk="1" fontAlgn="auto" latinLnBrk="0" hangingPunct="1">
-                        <a:lnSpc>
-                          <a:spcPct val="100000"/>
-                        </a:lnSpc>
-                        <a:spcBef>
-                          <a:spcPts val="0"/>
-                        </a:spcBef>
-                        <a:spcAft>
-                          <a:spcPts val="0"/>
-                        </a:spcAft>
-                        <a:buClrTx/>
-                        <a:buSzTx/>
-                        <a:buFontTx/>
-                        <a:buNone/>
-                        <a:tabLst/>
-                        <a:defRPr/>
-                      </a:pPr>
-                      <a:r>
-                        <a:rPr lang="en-GB" sz="1400" dirty="0"/>
-                        <a:t>Laser-Photodiode</a:t>
-                      </a:r>
-                    </a:p>
-                  </a:txBody>
-                  <a:tcPr/>
-                </a:tc>
-                <a:tc>
-                  <a:txBody>
-                    <a:bodyPr/>
-                    <a:lstStyle/>
-                    <a:p>
-                      <a:endParaRPr lang="en-GB" sz="1400" dirty="0"/>
-                    </a:p>
-                  </a:txBody>
-                  <a:tcPr/>
-                </a:tc>
-                <a:extLst>
-                  <a:ext uri="{0D108BD9-81ED-4DB2-BD59-A6C34878D82A}">
-                    <a16:rowId xmlns:a16="http://schemas.microsoft.com/office/drawing/2014/main" val="630006285"/>
-                  </a:ext>
-                </a:extLst>
-              </a:tr>
-            </a:tbl>
-          </a:graphicData>
-        </a:graphic>
-      </p:graphicFrame>
-      <p:graphicFrame>
-        <p:nvGraphicFramePr>
-          <p:cNvPr id="10" name="Table 9">
-            <a:extLst>
-              <a:ext uri="{FF2B5EF4-FFF2-40B4-BE49-F238E27FC236}">
-                <a16:creationId xmlns:a16="http://schemas.microsoft.com/office/drawing/2014/main" id="{04B6638D-F677-DF4C-C504-F2B9FEE28CB2}"/>
-              </a:ext>
-            </a:extLst>
-          </p:cNvPr>
-          <p:cNvGraphicFramePr>
-            <a:graphicFrameLocks noGrp="1"/>
-          </p:cNvGraphicFramePr>
-          <p:nvPr>
-            <p:extLst>
-              <p:ext uri="{D42A27DB-BD31-4B8C-83A1-F6EECF244321}">
-                <p14:modId xmlns:p14="http://schemas.microsoft.com/office/powerpoint/2010/main" val="2303819993"/>
-              </p:ext>
-            </p:extLst>
-          </p:nvPr>
-        </p:nvGraphicFramePr>
-        <p:xfrm>
-          <a:off x="107319" y="4122692"/>
-          <a:ext cx="4913256" cy="1303014"/>
-        </p:xfrm>
-        <a:graphic>
-          <a:graphicData uri="http://schemas.openxmlformats.org/drawingml/2006/table">
-            <a:tbl>
-              <a:tblPr firstRow="1" bandRow="1">
-                <a:tableStyleId>{5C22544A-7EE6-4342-B048-85BDC9FD1C3A}</a:tableStyleId>
-              </a:tblPr>
-              <a:tblGrid>
-                <a:gridCol w="1637752">
-                  <a:extLst>
-                    <a:ext uri="{9D8B030D-6E8A-4147-A177-3AD203B41FA5}">
-                      <a16:colId xmlns:a16="http://schemas.microsoft.com/office/drawing/2014/main" val="1850391757"/>
-                    </a:ext>
-                  </a:extLst>
-                </a:gridCol>
-                <a:gridCol w="1637752">
-                  <a:extLst>
-                    <a:ext uri="{9D8B030D-6E8A-4147-A177-3AD203B41FA5}">
-                      <a16:colId xmlns:a16="http://schemas.microsoft.com/office/drawing/2014/main" val="4213036188"/>
-                    </a:ext>
-                  </a:extLst>
-                </a:gridCol>
-                <a:gridCol w="1637752">
-                  <a:extLst>
-                    <a:ext uri="{9D8B030D-6E8A-4147-A177-3AD203B41FA5}">
-                      <a16:colId xmlns:a16="http://schemas.microsoft.com/office/drawing/2014/main" val="1427325391"/>
-                    </a:ext>
-                  </a:extLst>
-                </a:gridCol>
-              </a:tblGrid>
-              <a:tr h="249261">
-                <a:tc>
-                  <a:txBody>
-                    <a:bodyPr/>
-                    <a:lstStyle/>
-                    <a:p>
-                      <a:pPr marL="0" marR="0" lvl="0" indent="0" algn="ctr" defTabSz="914400" rtl="0" eaLnBrk="1" fontAlgn="auto" latinLnBrk="0" hangingPunct="1">
-                        <a:lnSpc>
-                          <a:spcPct val="100000"/>
-                        </a:lnSpc>
-                        <a:spcBef>
-                          <a:spcPts val="0"/>
-                        </a:spcBef>
-                        <a:spcAft>
-                          <a:spcPts val="0"/>
-                        </a:spcAft>
-                        <a:buClrTx/>
-                        <a:buSzTx/>
-                        <a:buFontTx/>
-                        <a:buNone/>
-                        <a:tabLst/>
-                        <a:defRPr/>
-                      </a:pPr>
-                      <a:r>
-                        <a:rPr lang="en-GB" sz="1600" dirty="0"/>
-                        <a:t>Haze</a:t>
-                      </a:r>
-                    </a:p>
-                  </a:txBody>
-                  <a:tcPr/>
-                </a:tc>
-                <a:tc>
-                  <a:txBody>
-                    <a:bodyPr/>
-                    <a:lstStyle/>
-                    <a:p>
-                      <a:pPr marL="0" marR="0" lvl="0" indent="0" algn="ctr" defTabSz="914400" rtl="0" eaLnBrk="1" fontAlgn="auto" latinLnBrk="0" hangingPunct="1">
-                        <a:lnSpc>
-                          <a:spcPct val="100000"/>
-                        </a:lnSpc>
-                        <a:spcBef>
-                          <a:spcPts val="0"/>
-                        </a:spcBef>
-                        <a:spcAft>
-                          <a:spcPts val="0"/>
-                        </a:spcAft>
-                        <a:buClrTx/>
-                        <a:buSzTx/>
-                        <a:buFontTx/>
-                        <a:buNone/>
-                        <a:tabLst/>
-                        <a:defRPr/>
-                      </a:pPr>
-                      <a:r>
-                        <a:rPr lang="en-GB" sz="1600" dirty="0"/>
-                        <a:t>option1</a:t>
-                      </a:r>
-                    </a:p>
-                  </a:txBody>
-                  <a:tcPr/>
-                </a:tc>
-                <a:tc>
-                  <a:txBody>
-                    <a:bodyPr/>
-                    <a:lstStyle/>
-                    <a:p>
-                      <a:pPr marL="0" marR="0" lvl="0" indent="0" algn="ctr" defTabSz="914400" rtl="0" eaLnBrk="1" fontAlgn="auto" latinLnBrk="0" hangingPunct="1">
-                        <a:lnSpc>
-                          <a:spcPct val="100000"/>
-                        </a:lnSpc>
-                        <a:spcBef>
-                          <a:spcPts val="0"/>
-                        </a:spcBef>
-                        <a:spcAft>
-                          <a:spcPts val="0"/>
-                        </a:spcAft>
-                        <a:buClrTx/>
-                        <a:buSzTx/>
-                        <a:buFontTx/>
-                        <a:buNone/>
-                        <a:tabLst/>
-                        <a:defRPr/>
-                      </a:pPr>
-                      <a:r>
-                        <a:rPr lang="en-GB" sz="1600" dirty="0"/>
-                        <a:t>option2</a:t>
-                      </a:r>
-                    </a:p>
-                  </a:txBody>
-                  <a:tcPr/>
-                </a:tc>
-                <a:extLst>
-                  <a:ext uri="{0D108BD9-81ED-4DB2-BD59-A6C34878D82A}">
-                    <a16:rowId xmlns:a16="http://schemas.microsoft.com/office/drawing/2014/main" val="1187130106"/>
-                  </a:ext>
-                </a:extLst>
-              </a:tr>
-              <a:tr h="331467">
-                <a:tc>
-                  <a:txBody>
-                    <a:bodyPr/>
-                    <a:lstStyle/>
-                    <a:p>
-                      <a:pPr marL="0" marR="0" lvl="0" indent="0" algn="l" defTabSz="914400" rtl="0" eaLnBrk="1" fontAlgn="auto" latinLnBrk="0" hangingPunct="1">
-                        <a:lnSpc>
-                          <a:spcPct val="100000"/>
-                        </a:lnSpc>
-                        <a:spcBef>
-                          <a:spcPts val="0"/>
-                        </a:spcBef>
-                        <a:spcAft>
-                          <a:spcPts val="0"/>
-                        </a:spcAft>
-                        <a:buClrTx/>
-                        <a:buSzTx/>
-                        <a:buFontTx/>
-                        <a:buNone/>
-                        <a:tabLst/>
-                        <a:defRPr/>
-                      </a:pPr>
-                      <a:r>
-                        <a:rPr lang="en-GB" sz="1400" dirty="0"/>
-                        <a:t>Polariser</a:t>
-                      </a:r>
-                    </a:p>
-                  </a:txBody>
-                  <a:tcPr/>
-                </a:tc>
-                <a:tc>
-                  <a:txBody>
-                    <a:bodyPr/>
-                    <a:lstStyle/>
-                    <a:p>
-                      <a:pPr marL="0" marR="0" lvl="0" indent="0" algn="l" defTabSz="914400" rtl="0" eaLnBrk="1" fontAlgn="auto" latinLnBrk="0" hangingPunct="1">
-                        <a:lnSpc>
-                          <a:spcPct val="100000"/>
-                        </a:lnSpc>
-                        <a:spcBef>
-                          <a:spcPts val="0"/>
-                        </a:spcBef>
-                        <a:spcAft>
-                          <a:spcPts val="0"/>
-                        </a:spcAft>
-                        <a:buClrTx/>
-                        <a:buSzTx/>
-                        <a:buFontTx/>
-                        <a:buNone/>
-                        <a:tabLst/>
-                        <a:defRPr/>
-                      </a:pPr>
-                      <a:endParaRPr lang="en-GB" sz="1400" dirty="0"/>
-                    </a:p>
-                  </a:txBody>
-                  <a:tcPr/>
-                </a:tc>
-                <a:tc>
-                  <a:txBody>
-                    <a:bodyPr/>
-                    <a:lstStyle/>
-                    <a:p>
-                      <a:pPr marL="0" marR="0" lvl="0" indent="0" algn="l" defTabSz="914400" rtl="0" eaLnBrk="1" fontAlgn="auto" latinLnBrk="0" hangingPunct="1">
-                        <a:lnSpc>
-                          <a:spcPct val="100000"/>
-                        </a:lnSpc>
-                        <a:spcBef>
-                          <a:spcPts val="0"/>
-                        </a:spcBef>
-                        <a:spcAft>
-                          <a:spcPts val="0"/>
-                        </a:spcAft>
-                        <a:buClrTx/>
-                        <a:buSzTx/>
-                        <a:buFontTx/>
-                        <a:buNone/>
-                        <a:tabLst/>
-                        <a:defRPr/>
-                      </a:pPr>
-                      <a:endParaRPr lang="en-GB" sz="1400" dirty="0"/>
-                    </a:p>
-                  </a:txBody>
-                  <a:tcPr/>
-                </a:tc>
-                <a:extLst>
-                  <a:ext uri="{0D108BD9-81ED-4DB2-BD59-A6C34878D82A}">
-                    <a16:rowId xmlns:a16="http://schemas.microsoft.com/office/drawing/2014/main" val="2899786032"/>
-                  </a:ext>
-                </a:extLst>
-              </a:tr>
-              <a:tr h="331467">
-                <a:tc>
-                  <a:txBody>
-                    <a:bodyPr/>
-                    <a:lstStyle/>
-                    <a:p>
-                      <a:pPr marL="0" marR="0" lvl="0" indent="0" algn="l" defTabSz="914400" rtl="0" eaLnBrk="1" fontAlgn="auto" latinLnBrk="0" hangingPunct="1">
-                        <a:lnSpc>
-                          <a:spcPct val="100000"/>
-                        </a:lnSpc>
-                        <a:spcBef>
-                          <a:spcPts val="0"/>
-                        </a:spcBef>
-                        <a:spcAft>
-                          <a:spcPts val="0"/>
-                        </a:spcAft>
-                        <a:buClrTx/>
-                        <a:buSzTx/>
-                        <a:buFontTx/>
-                        <a:buNone/>
-                        <a:tabLst/>
-                        <a:defRPr/>
-                      </a:pPr>
-                      <a:r>
-                        <a:rPr lang="en-GB" sz="1400" dirty="0"/>
-                        <a:t>Voltage</a:t>
-                      </a:r>
-                    </a:p>
-                  </a:txBody>
-                  <a:tcPr/>
-                </a:tc>
-                <a:tc>
-                  <a:txBody>
-                    <a:bodyPr/>
-                    <a:lstStyle/>
-                    <a:p>
-                      <a:pPr marL="0" marR="0" lvl="0" indent="0" algn="l" defTabSz="914400" rtl="0" eaLnBrk="1" fontAlgn="auto" latinLnBrk="0" hangingPunct="1">
-                        <a:lnSpc>
-                          <a:spcPct val="100000"/>
-                        </a:lnSpc>
-                        <a:spcBef>
-                          <a:spcPts val="0"/>
-                        </a:spcBef>
-                        <a:spcAft>
-                          <a:spcPts val="0"/>
-                        </a:spcAft>
-                        <a:buClrTx/>
-                        <a:buSzTx/>
-                        <a:buFontTx/>
-                        <a:buNone/>
-                        <a:tabLst/>
-                        <a:defRPr/>
-                      </a:pPr>
-                      <a:r>
-                        <a:rPr lang="en-GB" sz="1400" dirty="0"/>
-                        <a:t>Range </a:t>
-                      </a:r>
-                    </a:p>
-                  </a:txBody>
-                  <a:tcPr/>
-                </a:tc>
-                <a:tc>
-                  <a:txBody>
-                    <a:bodyPr/>
-                    <a:lstStyle/>
-                    <a:p>
-                      <a:pPr marL="0" marR="0" lvl="0" indent="0" algn="l" defTabSz="914400" rtl="0" eaLnBrk="1" fontAlgn="auto" latinLnBrk="0" hangingPunct="1">
-                        <a:lnSpc>
-                          <a:spcPct val="100000"/>
-                        </a:lnSpc>
-                        <a:spcBef>
-                          <a:spcPts val="0"/>
-                        </a:spcBef>
-                        <a:spcAft>
-                          <a:spcPts val="0"/>
-                        </a:spcAft>
-                        <a:buClrTx/>
-                        <a:buSzTx/>
-                        <a:buFontTx/>
-                        <a:buNone/>
-                        <a:tabLst/>
-                        <a:defRPr/>
-                      </a:pPr>
-                      <a:r>
-                        <a:rPr lang="en-GB" sz="1400" dirty="0"/>
-                        <a:t>Single Points</a:t>
-                      </a:r>
-                    </a:p>
-                  </a:txBody>
-                  <a:tcPr/>
-                </a:tc>
-                <a:extLst>
-                  <a:ext uri="{0D108BD9-81ED-4DB2-BD59-A6C34878D82A}">
-                    <a16:rowId xmlns:a16="http://schemas.microsoft.com/office/drawing/2014/main" val="764354390"/>
-                  </a:ext>
-                </a:extLst>
-              </a:tr>
-              <a:tr h="249261">
-                <a:tc>
-                  <a:txBody>
-                    <a:bodyPr/>
-                    <a:lstStyle/>
-                    <a:p>
-                      <a:r>
-                        <a:rPr lang="en-GB" sz="1400" dirty="0"/>
-                        <a:t>Tool</a:t>
-                      </a:r>
-                    </a:p>
-                  </a:txBody>
-                  <a:tcPr/>
-                </a:tc>
-                <a:tc>
-                  <a:txBody>
-                    <a:bodyPr/>
-                    <a:lstStyle/>
-                    <a:p>
-                      <a:pPr marL="0" marR="0" lvl="0" indent="0" algn="l" defTabSz="914400" rtl="0" eaLnBrk="1" fontAlgn="auto" latinLnBrk="0" hangingPunct="1">
-                        <a:lnSpc>
-                          <a:spcPct val="100000"/>
-                        </a:lnSpc>
-                        <a:spcBef>
-                          <a:spcPts val="0"/>
-                        </a:spcBef>
-                        <a:spcAft>
-                          <a:spcPts val="0"/>
-                        </a:spcAft>
-                        <a:buClrTx/>
-                        <a:buSzTx/>
-                        <a:buFontTx/>
-                        <a:buNone/>
-                        <a:tabLst/>
-                        <a:defRPr/>
-                      </a:pPr>
-                      <a:r>
-                        <a:rPr lang="en-GB" sz="1400" dirty="0"/>
-                        <a:t>Old Haze Gard</a:t>
-                      </a:r>
-                    </a:p>
-                  </a:txBody>
-                  <a:tcPr/>
-                </a:tc>
-                <a:tc>
-                  <a:txBody>
-                    <a:bodyPr/>
-                    <a:lstStyle/>
-                    <a:p>
-                      <a:r>
-                        <a:rPr lang="en-GB" sz="1400" dirty="0"/>
-                        <a:t>New Haze Gard</a:t>
-                      </a:r>
-                    </a:p>
-                  </a:txBody>
-                  <a:tcPr/>
-                </a:tc>
-                <a:extLst>
-                  <a:ext uri="{0D108BD9-81ED-4DB2-BD59-A6C34878D82A}">
-                    <a16:rowId xmlns:a16="http://schemas.microsoft.com/office/drawing/2014/main" val="630006285"/>
-                  </a:ext>
-                </a:extLst>
-              </a:tr>
-            </a:tbl>
-          </a:graphicData>
-        </a:graphic>
-      </p:graphicFrame>
-    </p:spTree>
-    <p:extLst>
-      <p:ext uri="{BB962C8B-B14F-4D97-AF65-F5344CB8AC3E}">
-        <p14:creationId xmlns:p14="http://schemas.microsoft.com/office/powerpoint/2010/main" val="2259676099"/>
-      </p:ext>
-    </p:extLst>
-  </p:cSld>
-  <p:clrMapOvr>
-    <a:masterClrMapping/>
-  </p:clrMapOvr>
-</p:sld>
-</file>
-
-<file path=ppt/slides/slide4.xml><?xml version="1.0" encoding="utf-8"?>
-<p:sld xmlns:a="http://schemas.openxmlformats.org/drawingml/2006/main" xmlns:r="http://schemas.openxmlformats.org/officeDocument/2006/relationships" xmlns:p="http://schemas.openxmlformats.org/presentationml/2006/main">
-  <p:cSld>
-    <p:spTree>
-      <p:nvGrpSpPr>
-        <p:cNvPr id="1" name=""/>
-        <p:cNvGrpSpPr/>
-        <p:nvPr/>
-      </p:nvGrpSpPr>
-      <p:grpSpPr>
-        <a:xfrm>
-          <a:off x="0" y="0"/>
-          <a:ext cx="0" cy="0"/>
-          <a:chOff x="0" y="0"/>
-          <a:chExt cx="0" cy="0"/>
-        </a:xfrm>
-      </p:grpSpPr>
-      <p:sp>
-        <p:nvSpPr>
-          <p:cNvPr id="2" name="Title 1">
-            <a:extLst>
-              <a:ext uri="{FF2B5EF4-FFF2-40B4-BE49-F238E27FC236}">
                 <a16:creationId xmlns:a16="http://schemas.microsoft.com/office/drawing/2014/main" id="{658BF00E-0019-B8D6-2051-3CB4F84B5ED0}"/>
               </a:ext>
             </a:extLst>
@@ -30541,7 +29086,7 @@
           <a:p>
             <a:fld id="{5412C376-BDD0-4F5E-823C-631F5729A383}" type="datetime1">
               <a:rPr lang="en-GB" smtClean="0"/>
-              <a:t>07/02/2025</a:t>
+              <a:t>17/03/2025</a:t>
             </a:fld>
             <a:endParaRPr lang="en-US" dirty="0"/>
           </a:p>
@@ -30571,7 +29116,7 @@
             <a:fld id="{263CF578-CC50-7F42-93DE-EF110206E425}" type="slidenum">
               <a:rPr lang="en-US" smtClean="0"/>
               <a:pPr/>
-              <a:t>4</a:t>
+              <a:t>3</a:t>
             </a:fld>
             <a:endParaRPr lang="en-US" dirty="0"/>
           </a:p>
@@ -31303,12 +29848,9 @@
               </a:pPr>
               <a:r>
                 <a:rPr lang="en-GB" sz="1000" b="1" dirty="0"/>
-                <a:t>Number of polarisers</a:t>
+                <a:t> </a:t>
               </a:r>
-              <a:r>
-                <a:rPr lang="en-GB" sz="1000" dirty="0"/>
-                <a:t>: 2</a:t>
-              </a:r>
+              <a:endParaRPr lang="en-GB" sz="1000" dirty="0"/>
             </a:p>
             <a:p>
               <a:pPr marL="800100" lvl="1" indent="-342900">
@@ -31857,7 +30399,7 @@
 </p:sld>
 </file>
 
-<file path=ppt/slides/slide5.xml><?xml version="1.0" encoding="utf-8"?>
+<file path=ppt/slides/slide4.xml><?xml version="1.0" encoding="utf-8"?>
 <p:sld xmlns:a="http://schemas.openxmlformats.org/drawingml/2006/main" xmlns:r="http://schemas.openxmlformats.org/officeDocument/2006/relationships" xmlns:p="http://schemas.openxmlformats.org/presentationml/2006/main">
   <p:cSld>
     <p:spTree>
@@ -31954,7 +30496,7 @@
           <a:p>
             <a:fld id="{5412C376-BDD0-4F5E-823C-631F5729A383}" type="datetime1">
               <a:rPr lang="en-GB" smtClean="0"/>
-              <a:t>07/02/2025</a:t>
+              <a:t>17/03/2025</a:t>
             </a:fld>
             <a:endParaRPr lang="en-US" dirty="0"/>
           </a:p>
@@ -31984,7 +30526,7 @@
             <a:fld id="{263CF578-CC50-7F42-93DE-EF110206E425}" type="slidenum">
               <a:rPr lang="en-US" smtClean="0"/>
               <a:pPr/>
-              <a:t>5</a:t>
+              <a:t>4</a:t>
             </a:fld>
             <a:endParaRPr lang="en-US" dirty="0"/>
           </a:p>
@@ -33468,7 +32010,7 @@
 </p:sld>
 </file>
 
-<file path=ppt/slides/slide6.xml><?xml version="1.0" encoding="utf-8"?>
+<file path=ppt/slides/slide5.xml><?xml version="1.0" encoding="utf-8"?>
 <p:sld xmlns:a="http://schemas.openxmlformats.org/drawingml/2006/main" xmlns:r="http://schemas.openxmlformats.org/officeDocument/2006/relationships" xmlns:p="http://schemas.openxmlformats.org/presentationml/2006/main">
   <p:cSld>
     <p:spTree>
@@ -33556,7 +32098,7 @@
           <a:p>
             <a:fld id="{5412C376-BDD0-4F5E-823C-631F5729A383}" type="datetime1">
               <a:rPr lang="en-GB" smtClean="0"/>
-              <a:t>07/02/2025</a:t>
+              <a:t>17/03/2025</a:t>
             </a:fld>
             <a:endParaRPr lang="en-US" dirty="0"/>
           </a:p>
@@ -33585,7 +32127,7 @@
             <a:fld id="{263CF578-CC50-7F42-93DE-EF110206E425}" type="slidenum">
               <a:rPr lang="en-US" smtClean="0"/>
               <a:pPr/>
-              <a:t>6</a:t>
+              <a:t>5</a:t>
             </a:fld>
             <a:endParaRPr lang="en-US" dirty="0"/>
           </a:p>
@@ -33900,14 +32442,12 @@
 </file>
 
 <file path=customXml/item1.xml><?xml version="1.0" encoding="utf-8"?>
-<p:properties xmlns:p="http://schemas.microsoft.com/office/2006/metadata/properties" xmlns:xsi="http://www.w3.org/2001/XMLSchema-instance" xmlns:pc="http://schemas.microsoft.com/office/infopath/2007/PartnerControls">
-  <documentManagement>
-    <lcf76f155ced4ddcb4097134ff3c332f xmlns="c35e0443-5ba3-412b-b32d-9ba531b79502">
-      <Terms xmlns="http://schemas.microsoft.com/office/infopath/2007/PartnerControls"/>
-    </lcf76f155ced4ddcb4097134ff3c332f>
-    <TaxCatchAll xmlns="6e2cda76-0099-406f-bfcc-eb423c21c746" xsi:nil="true"/>
-  </documentManagement>
-</p:properties>
+<?mso-contentType ?>
+<FormTemplates xmlns="http://schemas.microsoft.com/sharepoint/v3/contenttype/forms">
+  <Display>DocumentLibraryForm</Display>
+  <Edit>DocumentLibraryForm</Edit>
+  <New>DocumentLibraryForm</New>
+</FormTemplates>
 </file>
 
 <file path=customXml/item2.xml><?xml version="1.0" encoding="utf-8"?>
@@ -34136,27 +32676,20 @@
 </file>
 
 <file path=customXml/item3.xml><?xml version="1.0" encoding="utf-8"?>
-<?mso-contentType ?>
-<FormTemplates xmlns="http://schemas.microsoft.com/sharepoint/v3/contenttype/forms">
-  <Display>DocumentLibraryForm</Display>
-  <Edit>DocumentLibraryForm</Edit>
-  <New>DocumentLibraryForm</New>
-</FormTemplates>
+<p:properties xmlns:p="http://schemas.microsoft.com/office/2006/metadata/properties" xmlns:xsi="http://www.w3.org/2001/XMLSchema-instance" xmlns:pc="http://schemas.microsoft.com/office/infopath/2007/PartnerControls">
+  <documentManagement>
+    <lcf76f155ced4ddcb4097134ff3c332f xmlns="c35e0443-5ba3-412b-b32d-9ba531b79502">
+      <Terms xmlns="http://schemas.microsoft.com/office/infopath/2007/PartnerControls"/>
+    </lcf76f155ced4ddcb4097134ff3c332f>
+    <TaxCatchAll xmlns="6e2cda76-0099-406f-bfcc-eb423c21c746" xsi:nil="true"/>
+  </documentManagement>
+</p:properties>
 </file>
 
 <file path=customXml/itemProps1.xml><?xml version="1.0" encoding="utf-8"?>
-<ds:datastoreItem xmlns:ds="http://schemas.openxmlformats.org/officeDocument/2006/customXml" ds:itemID="{71399C73-C1F9-4CFF-9B27-64093ED4EBE5}">
+<ds:datastoreItem xmlns:ds="http://schemas.openxmlformats.org/officeDocument/2006/customXml" ds:itemID="{F0736A63-A48E-4C35-A36B-5B1D505FACFC}">
   <ds:schemaRefs>
-    <ds:schemaRef ds:uri="http://purl.org/dc/dcmitype/"/>
-    <ds:schemaRef ds:uri="http://purl.org/dc/terms/"/>
-    <ds:schemaRef ds:uri="c35e0443-5ba3-412b-b32d-9ba531b79502"/>
-    <ds:schemaRef ds:uri="http://purl.org/dc/elements/1.1/"/>
-    <ds:schemaRef ds:uri="http://schemas.microsoft.com/office/2006/documentManagement/types"/>
-    <ds:schemaRef ds:uri="http://schemas.microsoft.com/office/infopath/2007/PartnerControls"/>
-    <ds:schemaRef ds:uri="http://www.w3.org/XML/1998/namespace"/>
-    <ds:schemaRef ds:uri="http://schemas.openxmlformats.org/package/2006/metadata/core-properties"/>
-    <ds:schemaRef ds:uri="6e2cda76-0099-406f-bfcc-eb423c21c746"/>
-    <ds:schemaRef ds:uri="http://schemas.microsoft.com/office/2006/metadata/properties"/>
+    <ds:schemaRef ds:uri="http://schemas.microsoft.com/sharepoint/v3/contenttype/forms"/>
   </ds:schemaRefs>
 </ds:datastoreItem>
 </file>
@@ -34181,9 +32714,18 @@
 </file>
 
 <file path=customXml/itemProps3.xml><?xml version="1.0" encoding="utf-8"?>
-<ds:datastoreItem xmlns:ds="http://schemas.openxmlformats.org/officeDocument/2006/customXml" ds:itemID="{F0736A63-A48E-4C35-A36B-5B1D505FACFC}">
+<ds:datastoreItem xmlns:ds="http://schemas.openxmlformats.org/officeDocument/2006/customXml" ds:itemID="{71399C73-C1F9-4CFF-9B27-64093ED4EBE5}">
   <ds:schemaRefs>
-    <ds:schemaRef ds:uri="http://schemas.microsoft.com/sharepoint/v3/contenttype/forms"/>
+    <ds:schemaRef ds:uri="http://purl.org/dc/dcmitype/"/>
+    <ds:schemaRef ds:uri="http://purl.org/dc/terms/"/>
+    <ds:schemaRef ds:uri="c35e0443-5ba3-412b-b32d-9ba531b79502"/>
+    <ds:schemaRef ds:uri="http://purl.org/dc/elements/1.1/"/>
+    <ds:schemaRef ds:uri="http://schemas.microsoft.com/office/2006/documentManagement/types"/>
+    <ds:schemaRef ds:uri="http://schemas.microsoft.com/office/infopath/2007/PartnerControls"/>
+    <ds:schemaRef ds:uri="http://www.w3.org/XML/1998/namespace"/>
+    <ds:schemaRef ds:uri="http://schemas.openxmlformats.org/package/2006/metadata/core-properties"/>
+    <ds:schemaRef ds:uri="6e2cda76-0099-406f-bfcc-eb423c21c746"/>
+    <ds:schemaRef ds:uri="http://schemas.microsoft.com/office/2006/metadata/properties"/>
   </ds:schemaRefs>
 </ds:datastoreItem>
 </file>
</xml_diff>